<commit_message>
updated presentation with slides I have filled up
</commit_message>
<xml_diff>
--- a/code/Final Presentation v1.pptx
+++ b/code/Final Presentation v1.pptx
@@ -20,8 +20,8 @@
     <p:sldId id="425" r:id="rId11"/>
     <p:sldId id="426" r:id="rId12"/>
     <p:sldId id="427" r:id="rId13"/>
-    <p:sldId id="428" r:id="rId14"/>
-    <p:sldId id="429" r:id="rId15"/>
+    <p:sldId id="429" r:id="rId14"/>
+    <p:sldId id="428" r:id="rId15"/>
     <p:sldId id="430" r:id="rId16"/>
     <p:sldId id="431" r:id="rId17"/>
     <p:sldId id="432" r:id="rId18"/>
@@ -137,8 +137,8 @@
             <p14:sldId id="425"/>
             <p14:sldId id="426"/>
             <p14:sldId id="427"/>
+            <p14:sldId id="429"/>
             <p14:sldId id="428"/>
-            <p14:sldId id="429"/>
             <p14:sldId id="430"/>
             <p14:sldId id="431"/>
             <p14:sldId id="432"/>
@@ -165,6 +165,7 @@
 <file path=ppt/revisionInfo.xml><?xml version="1.0" encoding="utf-8"?>
 <p1510:revInfo xmlns:a="http://schemas.openxmlformats.org/drawingml/2006/main" xmlns:r="http://schemas.openxmlformats.org/officeDocument/2006/relationships" xmlns:p1510="http://schemas.microsoft.com/office/powerpoint/2015/10/main">
   <p1510:revLst>
+    <p1510:client id="{5A7EB027-AC00-478D-98E9-B0650B8934C4}" v="46" dt="2019-12-08T22:28:48.721"/>
     <p1510:client id="{8F36D813-87D7-4C61-BCBC-902B3EEED6AE}" v="21" dt="2019-12-08T19:54:49.266"/>
   </p1510:revLst>
 </p1510:revInfo>
@@ -258,7 +259,7 @@
                 <a:latin typeface="Segoe UI" panose="020B0502040204020203" pitchFamily="34" charset="0"/>
                 <a:cs typeface="Segoe UI" panose="020B0502040204020203" pitchFamily="34" charset="0"/>
               </a:rPr>
-              <a:t>12/7/2019</a:t>
+              <a:t>12/8/2019</a:t>
             </a:fld>
             <a:endParaRPr lang="en-US" dirty="0">
               <a:latin typeface="Segoe UI" panose="020B0502040204020203" pitchFamily="34" charset="0"/>
@@ -442,7 +443,7 @@
             <a:fld id="{8CEAF84F-AE06-7C4B-81DA-C19B1498DB6D}" type="datetimeFigureOut">
               <a:rPr lang="en-US" smtClean="0"/>
               <a:pPr/>
-              <a:t>12/7/2019</a:t>
+              <a:t>12/8/2019</a:t>
             </a:fld>
             <a:endParaRPr lang="en-US" dirty="0"/>
           </a:p>
@@ -21416,7 +21417,7 @@
           <p:cNvPr id="2" name="Text Placeholder 1">
             <a:extLst>
               <a:ext uri="{FF2B5EF4-FFF2-40B4-BE49-F238E27FC236}">
-                <a16:creationId xmlns:a16="http://schemas.microsoft.com/office/drawing/2014/main" id="{35018ACF-FA26-4209-9BE6-DB3C1C11ADE8}"/>
+                <a16:creationId xmlns:a16="http://schemas.microsoft.com/office/drawing/2014/main" id="{B027DFE6-7B18-47D6-914F-2EEACF285EE8}"/>
               </a:ext>
             </a:extLst>
           </p:cNvPr>
@@ -21433,43 +21434,87 @@
           <a:lstStyle/>
           <a:p>
             <a:r>
-              <a:rPr lang="en-US" dirty="0"/>
-              <a:t>Disposition Time</a:t>
+              <a:rPr lang="en-US" sz="4800" dirty="0"/>
+              <a:t>Disposition Time – Regression Approach</a:t>
             </a:r>
           </a:p>
         </p:txBody>
       </p:sp>
-      <p:sp>
-        <p:nvSpPr>
-          <p:cNvPr id="3" name="Text Placeholder 2">
+      <p:graphicFrame>
+        <p:nvGraphicFramePr>
+          <p:cNvPr id="7" name="Object 6">
             <a:extLst>
               <a:ext uri="{FF2B5EF4-FFF2-40B4-BE49-F238E27FC236}">
-                <a16:creationId xmlns:a16="http://schemas.microsoft.com/office/drawing/2014/main" id="{13A6D3CB-E251-4855-A5B2-2764EB21ABB8}"/>
+                <a16:creationId xmlns:a16="http://schemas.microsoft.com/office/drawing/2014/main" id="{ECD5624F-FF3E-4F08-9B94-3FB6DE9DED16}"/>
               </a:ext>
             </a:extLst>
           </p:cNvPr>
-          <p:cNvSpPr>
-            <a:spLocks noGrp="1"/>
-          </p:cNvSpPr>
+          <p:cNvGraphicFramePr>
+            <a:graphicFrameLocks noChangeAspect="1"/>
+          </p:cNvGraphicFramePr>
           <p:nvPr>
-            <p:ph type="body" sz="quarter" idx="16"/>
+            <p:extLst>
+              <p:ext uri="{D42A27DB-BD31-4B8C-83A1-F6EECF244321}">
+                <p14:modId xmlns:p14="http://schemas.microsoft.com/office/powerpoint/2010/main" val="4005478606"/>
+              </p:ext>
+            </p:extLst>
           </p:nvPr>
-        </p:nvSpPr>
-        <p:spPr/>
-        <p:txBody>
-          <a:bodyPr/>
-          <a:lstStyle/>
-          <a:p>
-            <a:endParaRPr lang="en-US"/>
-          </a:p>
-        </p:txBody>
-      </p:sp>
+        </p:nvGraphicFramePr>
+        <p:xfrm>
+          <a:off x="2932386" y="2250782"/>
+          <a:ext cx="6219497" cy="4638508"/>
+        </p:xfrm>
+        <a:graphic>
+          <a:graphicData uri="http://schemas.openxmlformats.org/presentationml/2006/ole">
+            <mc:AlternateContent xmlns:mc="http://schemas.openxmlformats.org/markup-compatibility/2006">
+              <mc:Choice xmlns:v="urn:schemas-microsoft-com:vml" Requires="v">
+                <p:oleObj spid="_x0000_s1026" name="Worksheet" r:id="rId3" imgW="4914794" imgH="3665370" progId="Excel.Sheet.12">
+                  <p:embed/>
+                </p:oleObj>
+              </mc:Choice>
+              <mc:Fallback>
+                <p:oleObj name="Worksheet" r:id="rId3" imgW="4914794" imgH="3665370" progId="Excel.Sheet.12">
+                  <p:embed/>
+                  <p:pic>
+                    <p:nvPicPr>
+                      <p:cNvPr id="7" name="Object 6">
+                        <a:extLst>
+                          <a:ext uri="{FF2B5EF4-FFF2-40B4-BE49-F238E27FC236}">
+                            <a16:creationId xmlns:a16="http://schemas.microsoft.com/office/drawing/2014/main" id="{ECD5624F-FF3E-4F08-9B94-3FB6DE9DED16}"/>
+                          </a:ext>
+                        </a:extLst>
+                      </p:cNvPr>
+                      <p:cNvPicPr/>
+                      <p:nvPr/>
+                    </p:nvPicPr>
+                    <p:blipFill>
+                      <a:blip r:embed="rId4"/>
+                      <a:stretch>
+                        <a:fillRect/>
+                      </a:stretch>
+                    </p:blipFill>
+                    <p:spPr>
+                      <a:xfrm>
+                        <a:off x="2932386" y="2250782"/>
+                        <a:ext cx="6219497" cy="4638508"/>
+                      </a:xfrm>
+                      <a:prstGeom prst="rect">
+                        <a:avLst/>
+                      </a:prstGeom>
+                    </p:spPr>
+                  </p:pic>
+                </p:oleObj>
+              </mc:Fallback>
+            </mc:AlternateContent>
+          </a:graphicData>
+        </a:graphic>
+      </p:graphicFrame>
       <p:sp>
         <p:nvSpPr>
-          <p:cNvPr id="4" name="TextBox 3">
+          <p:cNvPr id="8" name="TextBox 7">
             <a:extLst>
               <a:ext uri="{FF2B5EF4-FFF2-40B4-BE49-F238E27FC236}">
-                <a16:creationId xmlns:a16="http://schemas.microsoft.com/office/drawing/2014/main" id="{3C50E587-4E40-40D3-B713-E30BC86D1D74}"/>
+                <a16:creationId xmlns:a16="http://schemas.microsoft.com/office/drawing/2014/main" id="{54E780A5-F3F4-4807-A1B8-9E1A28D595A4}"/>
               </a:ext>
             </a:extLst>
           </p:cNvPr>
@@ -21478,15 +21523,15 @@
         </p:nvSpPr>
         <p:spPr>
           <a:xfrm>
-            <a:off x="4055677" y="5268271"/>
-            <a:ext cx="3413235" cy="446729"/>
+            <a:off x="1434660" y="1422838"/>
+            <a:ext cx="9128235" cy="625343"/>
           </a:xfrm>
           <a:prstGeom prst="rect">
             <a:avLst/>
           </a:prstGeom>
         </p:spPr>
         <p:txBody>
-          <a:bodyPr vert="horz" wrap="square" lIns="146304" tIns="91440" rIns="0" bIns="0" numCol="1" rtlCol="0">
+          <a:bodyPr vert="horz" wrap="square" lIns="146304" tIns="91440" rIns="0" bIns="0" numCol="1" rtlCol="0" anchor="ctr">
             <a:noAutofit/>
           </a:bodyPr>
           <a:lstStyle/>
@@ -21500,7 +21545,13 @@
               </a:spcBef>
             </a:pPr>
             <a:r>
-              <a:rPr lang="en-US" sz="1600" spc="50" dirty="0">
+              <a:rPr lang="en-US" sz="1800" spc="50" dirty="0">
+                <a:ln>
+                  <a:solidFill>
+                    <a:schemeClr val="tx1"/>
+                  </a:solidFill>
+                  <a:prstDash val="sysDash"/>
+                </a:ln>
                 <a:gradFill>
                   <a:gsLst>
                     <a:gs pos="14159">
@@ -21515,63 +21566,7 @@
                 <a:latin typeface="Segoe UI Semilight" panose="020B0402040204020203" pitchFamily="34" charset="0"/>
                 <a:cs typeface="Segoe UI Semilight" panose="020B0402040204020203" pitchFamily="34" charset="0"/>
               </a:rPr>
-              <a:t>Linear regression model here</a:t>
-            </a:r>
-          </a:p>
-        </p:txBody>
-      </p:sp>
-      <p:sp>
-        <p:nvSpPr>
-          <p:cNvPr id="5" name="TextBox 4">
-            <a:extLst>
-              <a:ext uri="{FF2B5EF4-FFF2-40B4-BE49-F238E27FC236}">
-                <a16:creationId xmlns:a16="http://schemas.microsoft.com/office/drawing/2014/main" id="{1ED54AD5-DC9C-4325-BA66-BF38F52E379D}"/>
-              </a:ext>
-            </a:extLst>
-          </p:cNvPr>
-          <p:cNvSpPr txBox="1"/>
-          <p:nvPr/>
-        </p:nvSpPr>
-        <p:spPr>
-          <a:xfrm>
-            <a:off x="3773867" y="5893676"/>
-            <a:ext cx="3976854" cy="446729"/>
-          </a:xfrm>
-          <a:prstGeom prst="rect">
-            <a:avLst/>
-          </a:prstGeom>
-        </p:spPr>
-        <p:txBody>
-          <a:bodyPr vert="horz" wrap="square" lIns="146304" tIns="91440" rIns="0" bIns="0" numCol="1" rtlCol="0">
-            <a:noAutofit/>
-          </a:bodyPr>
-          <a:lstStyle/>
-          <a:p>
-            <a:pPr algn="ctr">
-              <a:lnSpc>
-                <a:spcPct val="110000"/>
-              </a:lnSpc>
-              <a:spcBef>
-                <a:spcPts val="2000"/>
-              </a:spcBef>
-            </a:pPr>
-            <a:r>
-              <a:rPr lang="en-US" sz="1600" spc="50" dirty="0">
-                <a:gradFill>
-                  <a:gsLst>
-                    <a:gs pos="14159">
-                      <a:schemeClr val="tx1"/>
-                    </a:gs>
-                    <a:gs pos="32000">
-                      <a:schemeClr val="tx1"/>
-                    </a:gs>
-                  </a:gsLst>
-                  <a:lin ang="5400000" scaled="1"/>
-                </a:gradFill>
-                <a:latin typeface="Segoe UI Semilight" panose="020B0402040204020203" pitchFamily="34" charset="0"/>
-                <a:cs typeface="Segoe UI Semilight" panose="020B0402040204020203" pitchFamily="34" charset="0"/>
-              </a:rPr>
-              <a:t>One big graph . . . + . . . Text to explain</a:t>
+              <a:t>In addition to case events and charge traits, defendants’ immutable traits also have a relationship with disposition time</a:t>
             </a:r>
           </a:p>
         </p:txBody>
@@ -21579,7 +21574,7 @@
     </p:spTree>
     <p:extLst>
       <p:ext uri="{BB962C8B-B14F-4D97-AF65-F5344CB8AC3E}">
-        <p14:creationId xmlns:p14="http://schemas.microsoft.com/office/powerpoint/2010/main" val="1777275533"/>
+        <p14:creationId xmlns:p14="http://schemas.microsoft.com/office/powerpoint/2010/main" val="2153197818"/>
       </p:ext>
     </p:extLst>
   </p:cSld>
@@ -21614,7 +21609,7 @@
           <p:cNvPr id="2" name="Text Placeholder 1">
             <a:extLst>
               <a:ext uri="{FF2B5EF4-FFF2-40B4-BE49-F238E27FC236}">
-                <a16:creationId xmlns:a16="http://schemas.microsoft.com/office/drawing/2014/main" id="{B027DFE6-7B18-47D6-914F-2EEACF285EE8}"/>
+                <a16:creationId xmlns:a16="http://schemas.microsoft.com/office/drawing/2014/main" id="{35018ACF-FA26-4209-9BE6-DB3C1C11ADE8}"/>
               </a:ext>
             </a:extLst>
           </p:cNvPr>
@@ -21631,43 +21626,48 @@
           <a:lstStyle/>
           <a:p>
             <a:r>
-              <a:rPr lang="en-US" dirty="0"/>
-              <a:t>Disposition Time</a:t>
+              <a:rPr lang="en-US" sz="4800" dirty="0"/>
+              <a:t>Disposition Time – Tree Based Approach</a:t>
             </a:r>
           </a:p>
         </p:txBody>
       </p:sp>
-      <p:sp>
-        <p:nvSpPr>
-          <p:cNvPr id="3" name="Text Placeholder 2">
+      <p:pic>
+        <p:nvPicPr>
+          <p:cNvPr id="7" name="Picture 6" descr="A picture containing screenshot&#10;&#10;Description automatically generated">
             <a:extLst>
               <a:ext uri="{FF2B5EF4-FFF2-40B4-BE49-F238E27FC236}">
-                <a16:creationId xmlns:a16="http://schemas.microsoft.com/office/drawing/2014/main" id="{3A4137ED-E018-4C83-9450-C211C94EFAB3}"/>
+                <a16:creationId xmlns:a16="http://schemas.microsoft.com/office/drawing/2014/main" id="{957A6C3E-2C67-4172-8187-A7956AF95952}"/>
               </a:ext>
             </a:extLst>
           </p:cNvPr>
-          <p:cNvSpPr>
-            <a:spLocks noGrp="1"/>
-          </p:cNvSpPr>
-          <p:nvPr>
-            <p:ph type="body" sz="quarter" idx="16"/>
-          </p:nvPr>
-        </p:nvSpPr>
-        <p:spPr/>
-        <p:txBody>
-          <a:bodyPr/>
-          <a:lstStyle/>
-          <a:p>
-            <a:endParaRPr lang="en-US"/>
-          </a:p>
-        </p:txBody>
-      </p:sp>
+          <p:cNvPicPr>
+            <a:picLocks noChangeAspect="1"/>
+          </p:cNvPicPr>
+          <p:nvPr/>
+        </p:nvPicPr>
+        <p:blipFill>
+          <a:blip r:embed="rId2"/>
+          <a:stretch>
+            <a:fillRect/>
+          </a:stretch>
+        </p:blipFill>
+        <p:spPr>
+          <a:xfrm>
+            <a:off x="1883978" y="2048181"/>
+            <a:ext cx="8229599" cy="4598376"/>
+          </a:xfrm>
+          <a:prstGeom prst="rect">
+            <a:avLst/>
+          </a:prstGeom>
+        </p:spPr>
+      </p:pic>
       <p:sp>
         <p:nvSpPr>
-          <p:cNvPr id="4" name="TextBox 3">
+          <p:cNvPr id="10" name="TextBox 9">
             <a:extLst>
               <a:ext uri="{FF2B5EF4-FFF2-40B4-BE49-F238E27FC236}">
-                <a16:creationId xmlns:a16="http://schemas.microsoft.com/office/drawing/2014/main" id="{D8BEDA88-8C2F-4C53-913C-91AD98CEA1C4}"/>
+                <a16:creationId xmlns:a16="http://schemas.microsoft.com/office/drawing/2014/main" id="{EF41AC68-9713-4DDE-BAEF-D7642CF96017}"/>
               </a:ext>
             </a:extLst>
           </p:cNvPr>
@@ -21676,8 +21676,8 @@
         </p:nvSpPr>
         <p:spPr>
           <a:xfrm>
-            <a:off x="4055677" y="5268271"/>
-            <a:ext cx="3413235" cy="446729"/>
+            <a:off x="1434660" y="1422838"/>
+            <a:ext cx="9128235" cy="625343"/>
           </a:xfrm>
           <a:prstGeom prst="rect">
             <a:avLst/>
@@ -21698,7 +21698,13 @@
               </a:spcBef>
             </a:pPr>
             <a:r>
-              <a:rPr lang="en-US" sz="1600" spc="50" dirty="0">
+              <a:rPr lang="en-US" sz="1800" spc="50" dirty="0">
+                <a:ln>
+                  <a:solidFill>
+                    <a:schemeClr val="tx1"/>
+                  </a:solidFill>
+                  <a:prstDash val="sysDash"/>
+                </a:ln>
                 <a:gradFill>
                   <a:gsLst>
                     <a:gs pos="14159">
@@ -21713,63 +21719,7 @@
                 <a:latin typeface="Segoe UI Semilight" panose="020B0402040204020203" pitchFamily="34" charset="0"/>
                 <a:cs typeface="Segoe UI Semilight" panose="020B0402040204020203" pitchFamily="34" charset="0"/>
               </a:rPr>
-              <a:t>Regression Tree</a:t>
-            </a:r>
-          </a:p>
-        </p:txBody>
-      </p:sp>
-      <p:sp>
-        <p:nvSpPr>
-          <p:cNvPr id="5" name="TextBox 4">
-            <a:extLst>
-              <a:ext uri="{FF2B5EF4-FFF2-40B4-BE49-F238E27FC236}">
-                <a16:creationId xmlns:a16="http://schemas.microsoft.com/office/drawing/2014/main" id="{859316D3-A995-42E0-8064-E5323CC81D91}"/>
-              </a:ext>
-            </a:extLst>
-          </p:cNvPr>
-          <p:cNvSpPr txBox="1"/>
-          <p:nvPr/>
-        </p:nvSpPr>
-        <p:spPr>
-          <a:xfrm>
-            <a:off x="3824505" y="5867400"/>
-            <a:ext cx="4189689" cy="446729"/>
-          </a:xfrm>
-          <a:prstGeom prst="rect">
-            <a:avLst/>
-          </a:prstGeom>
-        </p:spPr>
-        <p:txBody>
-          <a:bodyPr vert="horz" wrap="square" lIns="146304" tIns="91440" rIns="0" bIns="0" numCol="1" rtlCol="0">
-            <a:noAutofit/>
-          </a:bodyPr>
-          <a:lstStyle/>
-          <a:p>
-            <a:pPr algn="ctr">
-              <a:lnSpc>
-                <a:spcPct val="110000"/>
-              </a:lnSpc>
-              <a:spcBef>
-                <a:spcPts val="2000"/>
-              </a:spcBef>
-            </a:pPr>
-            <a:r>
-              <a:rPr lang="en-US" sz="1600" spc="50" dirty="0">
-                <a:gradFill>
-                  <a:gsLst>
-                    <a:gs pos="14159">
-                      <a:schemeClr val="tx1"/>
-                    </a:gs>
-                    <a:gs pos="32000">
-                      <a:schemeClr val="tx1"/>
-                    </a:gs>
-                  </a:gsLst>
-                  <a:lin ang="5400000" scaled="1"/>
-                </a:gradFill>
-                <a:latin typeface="Segoe UI Semilight" panose="020B0402040204020203" pitchFamily="34" charset="0"/>
-                <a:cs typeface="Segoe UI Semilight" panose="020B0402040204020203" pitchFamily="34" charset="0"/>
-              </a:rPr>
-              <a:t>Tree graph . . . + . . . Text to explain</a:t>
+              <a:t>Case events and characteristic traits of the crime affect time to disposition of a case</a:t>
             </a:r>
           </a:p>
         </p:txBody>
@@ -21777,7 +21727,7 @@
     </p:spTree>
     <p:extLst>
       <p:ext uri="{BB962C8B-B14F-4D97-AF65-F5344CB8AC3E}">
-        <p14:creationId xmlns:p14="http://schemas.microsoft.com/office/powerpoint/2010/main" val="2153197818"/>
+        <p14:creationId xmlns:p14="http://schemas.microsoft.com/office/powerpoint/2010/main" val="1777275533"/>
       </p:ext>
     </p:extLst>
   </p:cSld>
@@ -21834,7 +21784,7 @@
           <a:lstStyle/>
           <a:p>
             <a:r>
-              <a:rPr lang="en-US" dirty="0"/>
+              <a:rPr lang="en-US" sz="4800" dirty="0"/>
               <a:t>Impact of Failure to Appear on Disposition</a:t>
             </a:r>
           </a:p>
@@ -22037,7 +21987,7 @@
           <a:lstStyle/>
           <a:p>
             <a:r>
-              <a:rPr lang="en-US" dirty="0"/>
+              <a:rPr lang="en-US" sz="4800" dirty="0"/>
               <a:t>Impact of Failure to Appear on Disposition</a:t>
             </a:r>
           </a:p>
@@ -22301,6 +22251,222 @@
       </p:grpSpPr>
       <p:sp>
         <p:nvSpPr>
+          <p:cNvPr id="15" name="Rectangle 14">
+            <a:extLst>
+              <a:ext uri="{FF2B5EF4-FFF2-40B4-BE49-F238E27FC236}">
+                <a16:creationId xmlns:a16="http://schemas.microsoft.com/office/drawing/2014/main" id="{6D00869E-9194-453B-800A-AF7476F5C8A5}"/>
+              </a:ext>
+            </a:extLst>
+          </p:cNvPr>
+          <p:cNvSpPr/>
+          <p:nvPr/>
+        </p:nvSpPr>
+        <p:spPr>
+          <a:xfrm>
+            <a:off x="2756338" y="3749700"/>
+            <a:ext cx="7922172" cy="969264"/>
+          </a:xfrm>
+          <a:prstGeom prst="rect">
+            <a:avLst/>
+          </a:prstGeom>
+          <a:noFill/>
+          <a:ln>
+            <a:solidFill>
+              <a:schemeClr val="tx1"/>
+            </a:solidFill>
+            <a:prstDash val="sysDash"/>
+          </a:ln>
+          <a:effectLst/>
+        </p:spPr>
+        <p:style>
+          <a:lnRef idx="1">
+            <a:schemeClr val="accent1"/>
+          </a:lnRef>
+          <a:fillRef idx="3">
+            <a:schemeClr val="accent1"/>
+          </a:fillRef>
+          <a:effectRef idx="2">
+            <a:schemeClr val="accent1"/>
+          </a:effectRef>
+          <a:fontRef idx="minor">
+            <a:schemeClr val="lt1"/>
+          </a:fontRef>
+        </p:style>
+        <p:txBody>
+          <a:bodyPr rot="0" spcFirstLastPara="0" vertOverflow="overflow" horzOverflow="overflow" vert="horz" wrap="square" lIns="91440" tIns="45720" rIns="91440" bIns="45720" numCol="1" spcCol="0" rtlCol="0" fromWordArt="0" anchor="ctr" anchorCtr="0" forceAA="0" compatLnSpc="1">
+            <a:prstTxWarp prst="textNoShape">
+              <a:avLst/>
+            </a:prstTxWarp>
+            <a:noAutofit/>
+          </a:bodyPr>
+          <a:lstStyle/>
+          <a:p>
+            <a:pPr lvl="1"/>
+            <a:r>
+              <a:rPr lang="en-US" dirty="0">
+                <a:gradFill>
+                  <a:gsLst>
+                    <a:gs pos="53097">
+                      <a:schemeClr val="tx1"/>
+                    </a:gs>
+                    <a:gs pos="29000">
+                      <a:schemeClr val="tx1"/>
+                    </a:gs>
+                  </a:gsLst>
+                  <a:lin ang="5400000" scaled="1"/>
+                </a:gradFill>
+              </a:rPr>
+              <a:t>Defendants released on bail appear on time before judges, and time to disposition for cases is reduced</a:t>
+            </a:r>
+          </a:p>
+        </p:txBody>
+      </p:sp>
+      <p:sp>
+        <p:nvSpPr>
+          <p:cNvPr id="16" name="Rectangle 15">
+            <a:extLst>
+              <a:ext uri="{FF2B5EF4-FFF2-40B4-BE49-F238E27FC236}">
+                <a16:creationId xmlns:a16="http://schemas.microsoft.com/office/drawing/2014/main" id="{D95C1A48-A921-4DFE-B781-A9B556A3DDC6}"/>
+              </a:ext>
+            </a:extLst>
+          </p:cNvPr>
+          <p:cNvSpPr/>
+          <p:nvPr/>
+        </p:nvSpPr>
+        <p:spPr>
+          <a:xfrm>
+            <a:off x="2756338" y="5503714"/>
+            <a:ext cx="7922172" cy="969264"/>
+          </a:xfrm>
+          <a:prstGeom prst="rect">
+            <a:avLst/>
+          </a:prstGeom>
+          <a:noFill/>
+          <a:ln>
+            <a:solidFill>
+              <a:schemeClr val="tx1"/>
+            </a:solidFill>
+            <a:prstDash val="sysDash"/>
+          </a:ln>
+          <a:effectLst/>
+        </p:spPr>
+        <p:style>
+          <a:lnRef idx="1">
+            <a:schemeClr val="accent1"/>
+          </a:lnRef>
+          <a:fillRef idx="3">
+            <a:schemeClr val="accent1"/>
+          </a:fillRef>
+          <a:effectRef idx="2">
+            <a:schemeClr val="accent1"/>
+          </a:effectRef>
+          <a:fontRef idx="minor">
+            <a:schemeClr val="lt1"/>
+          </a:fontRef>
+        </p:style>
+        <p:txBody>
+          <a:bodyPr rot="0" spcFirstLastPara="0" vertOverflow="overflow" horzOverflow="overflow" vert="horz" wrap="square" lIns="91440" tIns="45720" rIns="91440" bIns="45720" numCol="1" spcCol="0" rtlCol="0" fromWordArt="0" anchor="ctr" anchorCtr="0" forceAA="0" compatLnSpc="1">
+            <a:prstTxWarp prst="textNoShape">
+              <a:avLst/>
+            </a:prstTxWarp>
+            <a:noAutofit/>
+          </a:bodyPr>
+          <a:lstStyle/>
+          <a:p>
+            <a:pPr lvl="1"/>
+            <a:r>
+              <a:rPr lang="en-US" dirty="0">
+                <a:gradFill>
+                  <a:gsLst>
+                    <a:gs pos="53097">
+                      <a:schemeClr val="tx1"/>
+                    </a:gs>
+                    <a:gs pos="29000">
+                      <a:schemeClr val="tx1"/>
+                    </a:gs>
+                  </a:gsLst>
+                  <a:lin ang="5400000" scaled="1"/>
+                </a:gradFill>
+              </a:rPr>
+              <a:t>Identifying causes of longer disposition time, failure to appear and it’s impact on disposition</a:t>
+            </a:r>
+          </a:p>
+        </p:txBody>
+      </p:sp>
+      <p:sp>
+        <p:nvSpPr>
+          <p:cNvPr id="14" name="Rectangle 13">
+            <a:extLst>
+              <a:ext uri="{FF2B5EF4-FFF2-40B4-BE49-F238E27FC236}">
+                <a16:creationId xmlns:a16="http://schemas.microsoft.com/office/drawing/2014/main" id="{FB6F04DA-E492-499D-989B-BE8796FBAC44}"/>
+              </a:ext>
+            </a:extLst>
+          </p:cNvPr>
+          <p:cNvSpPr/>
+          <p:nvPr/>
+        </p:nvSpPr>
+        <p:spPr>
+          <a:xfrm>
+            <a:off x="2756338" y="1995686"/>
+            <a:ext cx="7922172" cy="969264"/>
+          </a:xfrm>
+          <a:prstGeom prst="rect">
+            <a:avLst/>
+          </a:prstGeom>
+          <a:noFill/>
+          <a:ln>
+            <a:solidFill>
+              <a:schemeClr val="tx1"/>
+            </a:solidFill>
+            <a:prstDash val="sysDash"/>
+          </a:ln>
+          <a:effectLst/>
+        </p:spPr>
+        <p:style>
+          <a:lnRef idx="1">
+            <a:schemeClr val="accent1"/>
+          </a:lnRef>
+          <a:fillRef idx="3">
+            <a:schemeClr val="accent1"/>
+          </a:fillRef>
+          <a:effectRef idx="2">
+            <a:schemeClr val="accent1"/>
+          </a:effectRef>
+          <a:fontRef idx="minor">
+            <a:schemeClr val="lt1"/>
+          </a:fontRef>
+        </p:style>
+        <p:txBody>
+          <a:bodyPr rot="0" spcFirstLastPara="0" vertOverflow="overflow" horzOverflow="overflow" vert="horz" wrap="square" lIns="91440" tIns="45720" rIns="91440" bIns="45720" numCol="1" spcCol="0" rtlCol="0" fromWordArt="0" anchor="ctr" anchorCtr="0" forceAA="0" compatLnSpc="1">
+            <a:prstTxWarp prst="textNoShape">
+              <a:avLst/>
+            </a:prstTxWarp>
+            <a:noAutofit/>
+          </a:bodyPr>
+          <a:lstStyle/>
+          <a:p>
+            <a:pPr lvl="1"/>
+            <a:r>
+              <a:rPr lang="en-US" dirty="0">
+                <a:gradFill>
+                  <a:gsLst>
+                    <a:gs pos="53097">
+                      <a:schemeClr val="tx1"/>
+                    </a:gs>
+                    <a:gs pos="29000">
+                      <a:schemeClr val="tx1"/>
+                    </a:gs>
+                  </a:gsLst>
+                  <a:lin ang="5400000" scaled="1"/>
+                </a:gradFill>
+              </a:rPr>
+              <a:t>The King County Court system experiences delays driven by defendants failing to appear in court</a:t>
+            </a:r>
+          </a:p>
+        </p:txBody>
+      </p:sp>
+      <p:sp>
+        <p:nvSpPr>
           <p:cNvPr id="2" name="Text Placeholder 1">
             <a:extLst>
               <a:ext uri="{FF2B5EF4-FFF2-40B4-BE49-F238E27FC236}">
@@ -22321,63 +22487,197 @@
           <a:lstStyle/>
           <a:p>
             <a:r>
-              <a:rPr lang="en-US" dirty="0"/>
-              <a:t>Problem Definition</a:t>
+              <a:rPr lang="en-US" sz="3600" dirty="0"/>
+              <a:t>Our study analyzes failure to appear and disposition time for King County Court</a:t>
             </a:r>
           </a:p>
         </p:txBody>
       </p:sp>
       <p:sp>
         <p:nvSpPr>
-          <p:cNvPr id="4" name="Text Placeholder 3">
+          <p:cNvPr id="10" name="Oval 9">
             <a:extLst>
               <a:ext uri="{FF2B5EF4-FFF2-40B4-BE49-F238E27FC236}">
-                <a16:creationId xmlns:a16="http://schemas.microsoft.com/office/drawing/2014/main" id="{CB28DADB-689B-4061-93ED-30D8AE428B8C}"/>
+                <a16:creationId xmlns:a16="http://schemas.microsoft.com/office/drawing/2014/main" id="{4D80A38D-67E0-40BE-BAA1-86839237EB22}"/>
               </a:ext>
             </a:extLst>
           </p:cNvPr>
-          <p:cNvSpPr>
-            <a:spLocks noGrp="1"/>
-          </p:cNvSpPr>
-          <p:nvPr>
-            <p:ph type="body" sz="quarter" idx="16"/>
-          </p:nvPr>
+          <p:cNvSpPr/>
+          <p:nvPr/>
         </p:nvSpPr>
-        <p:spPr/>
+        <p:spPr>
+          <a:xfrm>
+            <a:off x="880242" y="1743277"/>
+            <a:ext cx="2230821" cy="1463040"/>
+          </a:xfrm>
+          <a:prstGeom prst="ellipse">
+            <a:avLst/>
+          </a:prstGeom>
+          <a:solidFill>
+            <a:srgbClr val="DC0615"/>
+          </a:solidFill>
+          <a:ln>
+            <a:noFill/>
+          </a:ln>
+          <a:effectLst/>
+        </p:spPr>
+        <p:style>
+          <a:lnRef idx="1">
+            <a:schemeClr val="accent1"/>
+          </a:lnRef>
+          <a:fillRef idx="3">
+            <a:schemeClr val="accent1"/>
+          </a:fillRef>
+          <a:effectRef idx="2">
+            <a:schemeClr val="accent1"/>
+          </a:effectRef>
+          <a:fontRef idx="minor">
+            <a:schemeClr val="lt1"/>
+          </a:fontRef>
+        </p:style>
         <p:txBody>
-          <a:bodyPr/>
+          <a:bodyPr rot="0" spcFirstLastPara="0" vertOverflow="overflow" horzOverflow="overflow" vert="horz" wrap="square" lIns="91440" tIns="45720" rIns="91440" bIns="45720" numCol="1" spcCol="0" rtlCol="0" fromWordArt="0" anchor="ctr" anchorCtr="0" forceAA="0" compatLnSpc="1">
+            <a:prstTxWarp prst="textNoShape">
+              <a:avLst/>
+            </a:prstTxWarp>
+            <a:noAutofit/>
+          </a:bodyPr>
           <a:lstStyle/>
           <a:p>
-            <a:pPr>
-              <a:lnSpc>
-                <a:spcPct val="150000"/>
-              </a:lnSpc>
-            </a:pPr>
+            <a:pPr algn="ctr"/>
             <a:r>
-              <a:rPr lang="en-US" sz="2800" dirty="0"/>
+              <a:rPr lang="en-US" sz="1800" b="1" dirty="0">
+                <a:solidFill>
+                  <a:schemeClr val="bg1"/>
+                </a:solidFill>
+              </a:rPr>
               <a:t>Current State</a:t>
             </a:r>
           </a:p>
+        </p:txBody>
+      </p:sp>
+      <p:sp>
+        <p:nvSpPr>
+          <p:cNvPr id="11" name="Oval 10">
+            <a:extLst>
+              <a:ext uri="{FF2B5EF4-FFF2-40B4-BE49-F238E27FC236}">
+                <a16:creationId xmlns:a16="http://schemas.microsoft.com/office/drawing/2014/main" id="{8804E0F2-1B4A-45B5-A0A0-CEA584917914}"/>
+              </a:ext>
+            </a:extLst>
+          </p:cNvPr>
+          <p:cNvSpPr/>
+          <p:nvPr/>
+        </p:nvSpPr>
+        <p:spPr>
+          <a:xfrm>
+            <a:off x="880242" y="3497291"/>
+            <a:ext cx="2230821" cy="1463040"/>
+          </a:xfrm>
+          <a:prstGeom prst="ellipse">
+            <a:avLst/>
+          </a:prstGeom>
+          <a:solidFill>
+            <a:srgbClr val="DC0615"/>
+          </a:solidFill>
+          <a:ln>
+            <a:noFill/>
+          </a:ln>
+          <a:effectLst/>
+        </p:spPr>
+        <p:style>
+          <a:lnRef idx="1">
+            <a:schemeClr val="accent1"/>
+          </a:lnRef>
+          <a:fillRef idx="3">
+            <a:schemeClr val="accent1"/>
+          </a:fillRef>
+          <a:effectRef idx="2">
+            <a:schemeClr val="accent1"/>
+          </a:effectRef>
+          <a:fontRef idx="minor">
+            <a:schemeClr val="lt1"/>
+          </a:fontRef>
+        </p:style>
+        <p:txBody>
+          <a:bodyPr rot="0" spcFirstLastPara="0" vertOverflow="overflow" horzOverflow="overflow" vert="horz" wrap="square" lIns="91440" tIns="45720" rIns="91440" bIns="45720" numCol="1" spcCol="0" rtlCol="0" fromWordArt="0" anchor="ctr" anchorCtr="0" forceAA="0" compatLnSpc="1">
+            <a:prstTxWarp prst="textNoShape">
+              <a:avLst/>
+            </a:prstTxWarp>
+            <a:noAutofit/>
+          </a:bodyPr>
+          <a:lstStyle/>
           <a:p>
-            <a:pPr>
-              <a:lnSpc>
-                <a:spcPct val="150000"/>
-              </a:lnSpc>
-            </a:pPr>
+            <a:pPr algn="ctr"/>
             <a:r>
-              <a:rPr lang="en-US" sz="2800" dirty="0"/>
+              <a:rPr lang="en-US" sz="1800" b="1" dirty="0">
+                <a:solidFill>
+                  <a:schemeClr val="bg1"/>
+                </a:solidFill>
+              </a:rPr>
               <a:t>Desired Future State</a:t>
             </a:r>
           </a:p>
+        </p:txBody>
+      </p:sp>
+      <p:sp>
+        <p:nvSpPr>
+          <p:cNvPr id="12" name="Oval 11">
+            <a:extLst>
+              <a:ext uri="{FF2B5EF4-FFF2-40B4-BE49-F238E27FC236}">
+                <a16:creationId xmlns:a16="http://schemas.microsoft.com/office/drawing/2014/main" id="{85BFA43D-EBAC-45AA-AAA0-059D6A9E4F78}"/>
+              </a:ext>
+            </a:extLst>
+          </p:cNvPr>
+          <p:cNvSpPr/>
+          <p:nvPr/>
+        </p:nvSpPr>
+        <p:spPr>
+          <a:xfrm>
+            <a:off x="880242" y="5251305"/>
+            <a:ext cx="2230821" cy="1463040"/>
+          </a:xfrm>
+          <a:prstGeom prst="ellipse">
+            <a:avLst/>
+          </a:prstGeom>
+          <a:solidFill>
+            <a:srgbClr val="DC0615"/>
+          </a:solidFill>
+          <a:ln>
+            <a:noFill/>
+          </a:ln>
+          <a:effectLst/>
+        </p:spPr>
+        <p:style>
+          <a:lnRef idx="1">
+            <a:schemeClr val="accent1"/>
+          </a:lnRef>
+          <a:fillRef idx="3">
+            <a:schemeClr val="accent1"/>
+          </a:fillRef>
+          <a:effectRef idx="2">
+            <a:schemeClr val="accent1"/>
+          </a:effectRef>
+          <a:fontRef idx="minor">
+            <a:schemeClr val="lt1"/>
+          </a:fontRef>
+        </p:style>
+        <p:txBody>
+          <a:bodyPr rot="0" spcFirstLastPara="0" vertOverflow="overflow" horzOverflow="overflow" vert="horz" wrap="square" lIns="91440" tIns="45720" rIns="91440" bIns="45720" numCol="1" spcCol="0" rtlCol="0" fromWordArt="0" anchor="ctr" anchorCtr="0" forceAA="0" compatLnSpc="1">
+            <a:prstTxWarp prst="textNoShape">
+              <a:avLst/>
+            </a:prstTxWarp>
+            <a:noAutofit/>
+          </a:bodyPr>
+          <a:lstStyle/>
           <a:p>
-            <a:pPr>
-              <a:lnSpc>
-                <a:spcPct val="150000"/>
-              </a:lnSpc>
-            </a:pPr>
+            <a:pPr algn="ctr"/>
             <a:r>
-              <a:rPr lang="en-US" sz="2800" dirty="0"/>
-              <a:t>Benefit/Action Potential</a:t>
+              <a:rPr lang="en-US" sz="1800" b="1" dirty="0">
+                <a:solidFill>
+                  <a:schemeClr val="bg1"/>
+                </a:solidFill>
+              </a:rPr>
+              <a:t>Methodology</a:t>
             </a:r>
           </a:p>
         </p:txBody>
@@ -22461,10 +22761,57 @@
         </p:nvSpPr>
         <p:spPr/>
         <p:txBody>
-          <a:bodyPr/>
+          <a:bodyPr anchor="ctr"/>
           <a:lstStyle/>
           <a:p>
-            <a:endParaRPr lang="en-US"/>
+            <a:r>
+              <a:rPr lang="en-US" b="1" dirty="0"/>
+              <a:t>Case Data</a:t>
+            </a:r>
+            <a:r>
+              <a:rPr lang="en-US" dirty="0"/>
+              <a:t> – records every case</a:t>
+            </a:r>
+          </a:p>
+          <a:p>
+            <a:r>
+              <a:rPr lang="en-US" b="1" dirty="0"/>
+              <a:t>Case Event Data</a:t>
+            </a:r>
+            <a:r>
+              <a:rPr lang="en-US" dirty="0"/>
+              <a:t> – records of every event in a case</a:t>
+            </a:r>
+          </a:p>
+          <a:p>
+            <a:r>
+              <a:rPr lang="en-US" b="1" dirty="0"/>
+              <a:t>Charges Data</a:t>
+            </a:r>
+            <a:r>
+              <a:rPr lang="en-US" dirty="0"/>
+              <a:t> – records of every charge associated with a case</a:t>
+            </a:r>
+          </a:p>
+          <a:p>
+            <a:r>
+              <a:rPr lang="en-US" b="1" dirty="0"/>
+              <a:t>Custody History</a:t>
+            </a:r>
+            <a:r>
+              <a:rPr lang="en-US" dirty="0"/>
+              <a:t> – records of when defendants went into and out of custody</a:t>
+            </a:r>
+          </a:p>
+          <a:p>
+            <a:r>
+              <a:rPr lang="en-US" b="1" dirty="0"/>
+              <a:t>Criminal History</a:t>
+            </a:r>
+            <a:r>
+              <a:rPr lang="en-US" dirty="0"/>
+              <a:t> – records of past criminal activity of defendants</a:t>
+            </a:r>
           </a:p>
         </p:txBody>
       </p:sp>
@@ -22524,7 +22871,7 @@
           <a:p>
             <a:r>
               <a:rPr lang="en-US" dirty="0"/>
-              <a:t>EDA – Most Important Key Takeaway 1</a:t>
+              <a:t>EDA – show most important takeaway 1</a:t>
             </a:r>
           </a:p>
         </p:txBody>
@@ -22550,7 +22897,10 @@
           <a:bodyPr/>
           <a:lstStyle/>
           <a:p>
-            <a:endParaRPr lang="en-US"/>
+            <a:r>
+              <a:rPr lang="en-US" dirty="0"/>
+              <a:t>One graph and text explanation (1-2 lines max) required</a:t>
+            </a:r>
           </a:p>
         </p:txBody>
       </p:sp>
@@ -22610,7 +22960,7 @@
           <a:p>
             <a:r>
               <a:rPr lang="en-US" dirty="0"/>
-              <a:t>EDA – Most Important Key Takeaway 2</a:t>
+              <a:t>EDA – show most important takeaway 2</a:t>
             </a:r>
           </a:p>
         </p:txBody>
@@ -22636,7 +22986,13 @@
           <a:bodyPr/>
           <a:lstStyle/>
           <a:p>
-            <a:endParaRPr lang="en-US"/>
+            <a:r>
+              <a:rPr lang="en-US" dirty="0"/>
+              <a:t>One graph and text explanation (1-2 lines max) required</a:t>
+            </a:r>
+          </a:p>
+          <a:p>
+            <a:endParaRPr lang="en-US" dirty="0"/>
           </a:p>
         </p:txBody>
       </p:sp>
@@ -22696,7 +23052,7 @@
           <a:p>
             <a:r>
               <a:rPr lang="en-US" dirty="0"/>
-              <a:t>EDA – Most Important Key Takeaway 3</a:t>
+              <a:t>EDA – show most important takeaway 3</a:t>
             </a:r>
           </a:p>
         </p:txBody>
@@ -22722,7 +23078,13 @@
           <a:bodyPr/>
           <a:lstStyle/>
           <a:p>
-            <a:endParaRPr lang="en-US"/>
+            <a:r>
+              <a:rPr lang="en-US" dirty="0"/>
+              <a:t>One graph and text explanation (1-2 lines max) required</a:t>
+            </a:r>
+          </a:p>
+          <a:p>
+            <a:endParaRPr lang="en-US" dirty="0"/>
           </a:p>
         </p:txBody>
       </p:sp>
@@ -22808,7 +23170,7 @@
           <a:bodyPr/>
           <a:lstStyle/>
           <a:p>
-            <a:endParaRPr lang="en-US"/>
+            <a:endParaRPr lang="en-US" dirty="0"/>
           </a:p>
         </p:txBody>
       </p:sp>
@@ -22867,8 +23229,8 @@
           <a:lstStyle/>
           <a:p>
             <a:r>
-              <a:rPr lang="en-US" dirty="0"/>
-              <a:t>Failure To Appear</a:t>
+              <a:rPr lang="en-US" sz="4800" dirty="0"/>
+              <a:t>Failure To Appear – Regression Approach</a:t>
             </a:r>
           </a:p>
         </p:txBody>
@@ -23065,8 +23427,8 @@
           <a:lstStyle/>
           <a:p>
             <a:r>
-              <a:rPr lang="en-US" dirty="0"/>
-              <a:t>Failure To Appear</a:t>
+              <a:rPr lang="en-US" sz="4800" dirty="0"/>
+              <a:t>Failure To Appear – Tree Based Approach</a:t>
             </a:r>
           </a:p>
         </p:txBody>
@@ -24171,15 +24533,6 @@
 </file>
 
 <file path=customXml/item1.xml><?xml version="1.0" encoding="utf-8"?>
-<?mso-contentType ?>
-<FormTemplates xmlns="http://schemas.microsoft.com/sharepoint/v3/contenttype/forms">
-  <Display>DocumentLibraryForm</Display>
-  <Edit>DocumentLibraryForm</Edit>
-  <New>DocumentLibraryForm</New>
-</FormTemplates>
-</file>
-
-<file path=customXml/item2.xml><?xml version="1.0" encoding="utf-8"?>
 <ct:contentTypeSchema xmlns:ct="http://schemas.microsoft.com/office/2006/metadata/contentType" xmlns:ma="http://schemas.microsoft.com/office/2006/metadata/properties/metaAttributes" ct:_="" ma:_="" ma:contentTypeName="Document" ma:contentTypeID="0x010100DFA9D27695A1D945BC24A69FC5DC12E9" ma:contentTypeVersion="3" ma:contentTypeDescription="Create a new document." ma:contentTypeScope="" ma:versionID="f7cd7e8699080a6c913d3db0b67e4540">
   <xsd:schema xmlns:xsd="http://www.w3.org/2001/XMLSchema" xmlns:xs="http://www.w3.org/2001/XMLSchema" xmlns:p="http://schemas.microsoft.com/office/2006/metadata/properties" xmlns:ns2="1f581155-c77c-4bab-8aff-5f3b448407e4" targetNamespace="http://schemas.microsoft.com/office/2006/metadata/properties" ma:root="true" ma:fieldsID="3962ac589a26b7a3733dd1967c353524" ns2:_="">
     <xsd:import namespace="1f581155-c77c-4bab-8aff-5f3b448407e4"/>
@@ -24317,6 +24670,15 @@
 </ct:contentTypeSchema>
 </file>
 
+<file path=customXml/item2.xml><?xml version="1.0" encoding="utf-8"?>
+<?mso-contentType ?>
+<FormTemplates xmlns="http://schemas.microsoft.com/sharepoint/v3/contenttype/forms">
+  <Display>DocumentLibraryForm</Display>
+  <Edit>DocumentLibraryForm</Edit>
+  <New>DocumentLibraryForm</New>
+</FormTemplates>
+</file>
+
 <file path=customXml/item3.xml><?xml version="1.0" encoding="utf-8"?>
 <p:properties xmlns:p="http://schemas.microsoft.com/office/2006/metadata/properties" xmlns:xsi="http://www.w3.org/2001/XMLSchema-instance" xmlns:pc="http://schemas.microsoft.com/office/infopath/2007/PartnerControls">
   <documentManagement/>
@@ -24324,14 +24686,6 @@
 </file>
 
 <file path=customXml/itemProps1.xml><?xml version="1.0" encoding="utf-8"?>
-<ds:datastoreItem xmlns:ds="http://schemas.openxmlformats.org/officeDocument/2006/customXml" ds:itemID="{05623C56-7193-40AD-BD8E-DC4135AFF093}">
-  <ds:schemaRefs>
-    <ds:schemaRef ds:uri="http://schemas.microsoft.com/sharepoint/v3/contenttype/forms"/>
-  </ds:schemaRefs>
-</ds:datastoreItem>
-</file>
-
-<file path=customXml/itemProps2.xml><?xml version="1.0" encoding="utf-8"?>
 <ds:datastoreItem xmlns:ds="http://schemas.openxmlformats.org/officeDocument/2006/customXml" ds:itemID="{727F2F7D-BE07-4C6C-9D4D-E7B6954FE7AA}">
   <ds:schemaRefs>
     <ds:schemaRef ds:uri="http://schemas.microsoft.com/office/2006/metadata/contentType"/>
@@ -24349,18 +24703,19 @@
 </ds:datastoreItem>
 </file>
 
+<file path=customXml/itemProps2.xml><?xml version="1.0" encoding="utf-8"?>
+<ds:datastoreItem xmlns:ds="http://schemas.openxmlformats.org/officeDocument/2006/customXml" ds:itemID="{05623C56-7193-40AD-BD8E-DC4135AFF093}">
+  <ds:schemaRefs>
+    <ds:schemaRef ds:uri="http://schemas.microsoft.com/sharepoint/v3/contenttype/forms"/>
+  </ds:schemaRefs>
+</ds:datastoreItem>
+</file>
+
 <file path=customXml/itemProps3.xml><?xml version="1.0" encoding="utf-8"?>
 <ds:datastoreItem xmlns:ds="http://schemas.openxmlformats.org/officeDocument/2006/customXml" ds:itemID="{891FD44B-3985-41BB-9AB5-F9CACBD115C1}">
   <ds:schemaRefs>
-    <ds:schemaRef ds:uri="http://www.w3.org/XML/1998/namespace"/>
-    <ds:schemaRef ds:uri="http://schemas.microsoft.com/office/2006/documentManagement/types"/>
-    <ds:schemaRef ds:uri="http://purl.org/dc/terms/"/>
-    <ds:schemaRef ds:uri="http://purl.org/dc/elements/1.1/"/>
-    <ds:schemaRef ds:uri="1f581155-c77c-4bab-8aff-5f3b448407e4"/>
+    <ds:schemaRef ds:uri="http://schemas.microsoft.com/office/2006/metadata/properties"/>
     <ds:schemaRef ds:uri="http://schemas.microsoft.com/office/infopath/2007/PartnerControls"/>
-    <ds:schemaRef ds:uri="http://schemas.openxmlformats.org/package/2006/metadata/core-properties"/>
-    <ds:schemaRef ds:uri="http://schemas.microsoft.com/office/2006/metadata/properties"/>
-    <ds:schemaRef ds:uri="http://purl.org/dc/dcmitype/"/>
   </ds:schemaRefs>
 </ds:datastoreItem>
 </file>
</xml_diff>